<commit_message>
server script work started
</commit_message>
<xml_diff>
--- a/DOCS/First Review.pptx
+++ b/DOCS/First Review.pptx
@@ -246,7 +246,7 @@
             <a:fld id="{1BC5A6D6-678F-47D8-91DE-2A07AB82649C}" type="datetimeFigureOut">
               <a:rPr lang="en-US" smtClean="0"/>
               <a:pPr/>
-              <a:t>2/20/2024</a:t>
+              <a:t>2/21/2024</a:t>
             </a:fld>
             <a:endParaRPr lang="en-US"/>
           </a:p>
@@ -773,7 +773,7 @@
             <a:fld id="{CF705531-103C-4EA6-8A04-8B669A93EC46}" type="datetimeFigureOut">
               <a:rPr lang="en-US" smtClean="0"/>
               <a:pPr/>
-              <a:t>2/20/2024</a:t>
+              <a:t>2/21/2024</a:t>
             </a:fld>
             <a:endParaRPr lang="en-US"/>
           </a:p>
@@ -938,7 +938,7 @@
             <a:fld id="{CF705531-103C-4EA6-8A04-8B669A93EC46}" type="datetimeFigureOut">
               <a:rPr lang="en-US" smtClean="0"/>
               <a:pPr/>
-              <a:t>2/20/2024</a:t>
+              <a:t>2/21/2024</a:t>
             </a:fld>
             <a:endParaRPr lang="en-US"/>
           </a:p>
@@ -1113,7 +1113,7 @@
             <a:fld id="{CF705531-103C-4EA6-8A04-8B669A93EC46}" type="datetimeFigureOut">
               <a:rPr lang="en-US" smtClean="0"/>
               <a:pPr/>
-              <a:t>2/20/2024</a:t>
+              <a:t>2/21/2024</a:t>
             </a:fld>
             <a:endParaRPr lang="en-US"/>
           </a:p>
@@ -1278,7 +1278,7 @@
             <a:fld id="{CF705531-103C-4EA6-8A04-8B669A93EC46}" type="datetimeFigureOut">
               <a:rPr lang="en-US" smtClean="0"/>
               <a:pPr/>
-              <a:t>2/20/2024</a:t>
+              <a:t>2/21/2024</a:t>
             </a:fld>
             <a:endParaRPr lang="en-US"/>
           </a:p>
@@ -1520,7 +1520,7 @@
             <a:fld id="{CF705531-103C-4EA6-8A04-8B669A93EC46}" type="datetimeFigureOut">
               <a:rPr lang="en-US" smtClean="0"/>
               <a:pPr/>
-              <a:t>2/20/2024</a:t>
+              <a:t>2/21/2024</a:t>
             </a:fld>
             <a:endParaRPr lang="en-US"/>
           </a:p>
@@ -1802,7 +1802,7 @@
             <a:fld id="{CF705531-103C-4EA6-8A04-8B669A93EC46}" type="datetimeFigureOut">
               <a:rPr lang="en-US" smtClean="0"/>
               <a:pPr/>
-              <a:t>2/20/2024</a:t>
+              <a:t>2/21/2024</a:t>
             </a:fld>
             <a:endParaRPr lang="en-US"/>
           </a:p>
@@ -2223,7 +2223,7 @@
             <a:fld id="{CF705531-103C-4EA6-8A04-8B669A93EC46}" type="datetimeFigureOut">
               <a:rPr lang="en-US" smtClean="0"/>
               <a:pPr/>
-              <a:t>2/20/2024</a:t>
+              <a:t>2/21/2024</a:t>
             </a:fld>
             <a:endParaRPr lang="en-US"/>
           </a:p>
@@ -2337,7 +2337,7 @@
             <a:fld id="{CF705531-103C-4EA6-8A04-8B669A93EC46}" type="datetimeFigureOut">
               <a:rPr lang="en-US" smtClean="0"/>
               <a:pPr/>
-              <a:t>2/20/2024</a:t>
+              <a:t>2/21/2024</a:t>
             </a:fld>
             <a:endParaRPr lang="en-US"/>
           </a:p>
@@ -2429,7 +2429,7 @@
             <a:fld id="{CF705531-103C-4EA6-8A04-8B669A93EC46}" type="datetimeFigureOut">
               <a:rPr lang="en-US" smtClean="0"/>
               <a:pPr/>
-              <a:t>2/20/2024</a:t>
+              <a:t>2/21/2024</a:t>
             </a:fld>
             <a:endParaRPr lang="en-US"/>
           </a:p>
@@ -2701,7 +2701,7 @@
             <a:fld id="{CF705531-103C-4EA6-8A04-8B669A93EC46}" type="datetimeFigureOut">
               <a:rPr lang="en-US" smtClean="0"/>
               <a:pPr/>
-              <a:t>2/20/2024</a:t>
+              <a:t>2/21/2024</a:t>
             </a:fld>
             <a:endParaRPr lang="en-US"/>
           </a:p>
@@ -2950,7 +2950,7 @@
             <a:fld id="{CF705531-103C-4EA6-8A04-8B669A93EC46}" type="datetimeFigureOut">
               <a:rPr lang="en-US" smtClean="0"/>
               <a:pPr/>
-              <a:t>2/20/2024</a:t>
+              <a:t>2/21/2024</a:t>
             </a:fld>
             <a:endParaRPr lang="en-US"/>
           </a:p>
@@ -3158,7 +3158,7 @@
             <a:fld id="{CF705531-103C-4EA6-8A04-8B669A93EC46}" type="datetimeFigureOut">
               <a:rPr lang="en-US" smtClean="0"/>
               <a:pPr/>
-              <a:t>2/20/2024</a:t>
+              <a:t>2/21/2024</a:t>
             </a:fld>
             <a:endParaRPr lang="en-US"/>
           </a:p>
@@ -9794,8 +9794,8 @@
         </p:nvSpPr>
         <p:spPr>
           <a:xfrm>
-            <a:off x="649432" y="1508766"/>
-            <a:ext cx="10893136" cy="4524315"/>
+            <a:off x="689264" y="818102"/>
+            <a:ext cx="10893136" cy="5632311"/>
           </a:xfrm>
           <a:prstGeom prst="rect">
             <a:avLst/>
@@ -9808,6 +9808,68 @@
           </a:bodyPr>
           <a:lstStyle/>
           <a:p>
+            <a:pPr marL="342900" indent="-342900" algn="just">
+              <a:lnSpc>
+                <a:spcPct val="150000"/>
+              </a:lnSpc>
+              <a:buFont typeface="Wingdings" panose="05000000000000000000" pitchFamily="2" charset="2"/>
+              <a:buChar char="v"/>
+            </a:pPr>
+            <a:r>
+              <a:rPr lang="en-US" sz="2400" dirty="0">
+                <a:latin typeface="Times New Roman" panose="02020603050405020304" pitchFamily="18" charset="0"/>
+                <a:cs typeface="Times New Roman" panose="02020603050405020304" pitchFamily="18" charset="0"/>
+              </a:rPr>
+              <a:t>Basic Encrypted Chat</a:t>
+            </a:r>
+            <a:r>
+              <a:rPr lang="en-US" sz="2400" dirty="0" smtClean="0">
+                <a:latin typeface="Times New Roman" panose="02020603050405020304" pitchFamily="18" charset="0"/>
+                <a:cs typeface="Times New Roman" panose="02020603050405020304" pitchFamily="18" charset="0"/>
+              </a:rPr>
+              <a:t>:</a:t>
+            </a:r>
+            <a:endParaRPr lang="en-US" sz="2400" dirty="0">
+              <a:latin typeface="Times New Roman" panose="02020603050405020304" pitchFamily="18" charset="0"/>
+              <a:cs typeface="Times New Roman" panose="02020603050405020304" pitchFamily="18" charset="0"/>
+            </a:endParaRPr>
+          </a:p>
+          <a:p>
+            <a:pPr lvl="1" algn="just">
+              <a:lnSpc>
+                <a:spcPct val="150000"/>
+              </a:lnSpc>
+            </a:pPr>
+            <a:r>
+              <a:rPr lang="en-US" sz="2400" dirty="0" smtClean="0">
+                <a:latin typeface="Times New Roman" panose="02020603050405020304" pitchFamily="18" charset="0"/>
+                <a:cs typeface="Times New Roman" panose="02020603050405020304" pitchFamily="18" charset="0"/>
+              </a:rPr>
+              <a:t>Typically</a:t>
+            </a:r>
+            <a:r>
+              <a:rPr lang="en-US" sz="2400" dirty="0">
+                <a:latin typeface="Times New Roman" panose="02020603050405020304" pitchFamily="18" charset="0"/>
+                <a:cs typeface="Times New Roman" panose="02020603050405020304" pitchFamily="18" charset="0"/>
+              </a:rPr>
+              <a:t>, existing chat applications use encryption protocols (e.g., TLS/SSL) to secure data in </a:t>
+            </a:r>
+            <a:r>
+              <a:rPr lang="en-US" sz="2400" dirty="0" smtClean="0">
+                <a:latin typeface="Times New Roman" panose="02020603050405020304" pitchFamily="18" charset="0"/>
+                <a:cs typeface="Times New Roman" panose="02020603050405020304" pitchFamily="18" charset="0"/>
+              </a:rPr>
+              <a:t>transit. However</a:t>
+            </a:r>
+            <a:r>
+              <a:rPr lang="en-US" sz="2400" dirty="0">
+                <a:latin typeface="Times New Roman" panose="02020603050405020304" pitchFamily="18" charset="0"/>
+                <a:cs typeface="Times New Roman" panose="02020603050405020304" pitchFamily="18" charset="0"/>
+              </a:rPr>
+              <a:t>, end-to-end encryption may not be universal, leaving potential vulnerabilities.</a:t>
+            </a:r>
+          </a:p>
+          <a:p>
             <a:pPr marL="285750" indent="-285750" algn="just">
               <a:lnSpc>
                 <a:spcPct val="150000"/>
@@ -9816,61 +9878,81 @@
               <a:buChar char="v"/>
             </a:pPr>
             <a:r>
-              <a:rPr lang="en-IN" sz="2400" dirty="0">
-                <a:latin typeface="Times New Roman" panose="02020603050405020304" pitchFamily="18" charset="0"/>
-                <a:cs typeface="Times New Roman" panose="02020603050405020304" pitchFamily="18" charset="0"/>
-              </a:rPr>
-              <a:t>[1]. Mirza K. B. Shuhan1, Tariqul Islam2. </a:t>
-            </a:r>
-            <a:r>
-              <a:rPr lang="en-IN" sz="2400" dirty="0" smtClean="0">
-                <a:latin typeface="Times New Roman" panose="02020603050405020304" pitchFamily="18" charset="0"/>
-                <a:cs typeface="Times New Roman" panose="02020603050405020304" pitchFamily="18" charset="0"/>
-              </a:rPr>
-              <a:t>IEEE (</a:t>
-            </a:r>
-            <a:r>
-              <a:rPr lang="en-IN" sz="2400" dirty="0" smtClean="0">
-                <a:latin typeface="Times New Roman" panose="02020603050405020304" pitchFamily="18" charset="0"/>
-                <a:cs typeface="Times New Roman" panose="02020603050405020304" pitchFamily="18" charset="0"/>
-                <a:hlinkClick r:id="rId2"/>
-              </a:rPr>
-              <a:t>arXiv:2308.04452v1</a:t>
-            </a:r>
-            <a:r>
-              <a:rPr lang="en-IN" sz="2400" dirty="0" smtClean="0">
-                <a:latin typeface="Times New Roman" panose="02020603050405020304" pitchFamily="18" charset="0"/>
-                <a:cs typeface="Times New Roman" panose="02020603050405020304" pitchFamily="18" charset="0"/>
-              </a:rPr>
-              <a:t>) </a:t>
-            </a:r>
-            <a:r>
-              <a:rPr lang="en-IN" sz="2400" dirty="0">
-                <a:latin typeface="Times New Roman" panose="02020603050405020304" pitchFamily="18" charset="0"/>
-                <a:cs typeface="Times New Roman" panose="02020603050405020304" pitchFamily="18" charset="0"/>
-              </a:rPr>
-              <a:t>[cs.CR] 5 Aug 2023. </a:t>
-            </a:r>
-            <a:r>
               <a:rPr lang="en-US" sz="2400" dirty="0">
                 <a:latin typeface="Times New Roman" panose="02020603050405020304" pitchFamily="18" charset="0"/>
                 <a:cs typeface="Times New Roman" panose="02020603050405020304" pitchFamily="18" charset="0"/>
               </a:rPr>
-              <a:t>Quarks: A Secure and </a:t>
+              <a:t>User </a:t>
             </a:r>
             <a:r>
               <a:rPr lang="en-US" sz="2400" dirty="0" smtClean="0">
                 <a:latin typeface="Times New Roman" panose="02020603050405020304" pitchFamily="18" charset="0"/>
                 <a:cs typeface="Times New Roman" panose="02020603050405020304" pitchFamily="18" charset="0"/>
               </a:rPr>
-              <a:t>Decentralized Block-chain Based </a:t>
-            </a:r>
+              <a:t>Authentication:</a:t>
+            </a:r>
+          </a:p>
+          <a:p>
+            <a:pPr algn="just">
+              <a:lnSpc>
+                <a:spcPct val="150000"/>
+              </a:lnSpc>
+            </a:pPr>
             <a:r>
               <a:rPr lang="en-US" sz="2400" dirty="0">
                 <a:latin typeface="Times New Roman" panose="02020603050405020304" pitchFamily="18" charset="0"/>
                 <a:cs typeface="Times New Roman" panose="02020603050405020304" pitchFamily="18" charset="0"/>
               </a:rPr>
-              <a:t>Messaging Network</a:t>
+              <a:t>	</a:t>
+            </a:r>
+            <a:r>
+              <a:rPr lang="en-US" sz="2400" dirty="0" smtClean="0">
+                <a:latin typeface="Times New Roman" panose="02020603050405020304" pitchFamily="18" charset="0"/>
+                <a:cs typeface="Times New Roman" panose="02020603050405020304" pitchFamily="18" charset="0"/>
+              </a:rPr>
+              <a:t>Commonly</a:t>
+            </a:r>
+            <a:r>
+              <a:rPr lang="en-US" sz="2400" dirty="0">
+                <a:latin typeface="Times New Roman" panose="02020603050405020304" pitchFamily="18" charset="0"/>
+                <a:cs typeface="Times New Roman" panose="02020603050405020304" pitchFamily="18" charset="0"/>
+              </a:rPr>
+              <a:t>, user authentication relies on usernames and </a:t>
+            </a:r>
+            <a:r>
+              <a:rPr lang="en-US" sz="2400" dirty="0" smtClean="0">
+                <a:latin typeface="Times New Roman" panose="02020603050405020304" pitchFamily="18" charset="0"/>
+                <a:cs typeface="Times New Roman" panose="02020603050405020304" pitchFamily="18" charset="0"/>
+              </a:rPr>
+              <a:t>passwords.</a:t>
+            </a:r>
+          </a:p>
+          <a:p>
+            <a:pPr algn="just">
+              <a:lnSpc>
+                <a:spcPct val="150000"/>
+              </a:lnSpc>
+            </a:pPr>
+            <a:r>
+              <a:rPr lang="en-US" sz="2400" dirty="0">
+                <a:latin typeface="Times New Roman" panose="02020603050405020304" pitchFamily="18" charset="0"/>
+                <a:cs typeface="Times New Roman" panose="02020603050405020304" pitchFamily="18" charset="0"/>
+              </a:rPr>
+              <a:t>	</a:t>
+            </a:r>
+            <a:r>
+              <a:rPr lang="en-US" sz="2400" dirty="0" smtClean="0">
+                <a:latin typeface="Times New Roman" panose="02020603050405020304" pitchFamily="18" charset="0"/>
+                <a:cs typeface="Times New Roman" panose="02020603050405020304" pitchFamily="18" charset="0"/>
+              </a:rPr>
+              <a:t>Centralized </a:t>
+            </a:r>
+            <a:r>
+              <a:rPr lang="en-US" sz="2400" dirty="0">
+                <a:latin typeface="Times New Roman" panose="02020603050405020304" pitchFamily="18" charset="0"/>
+                <a:cs typeface="Times New Roman" panose="02020603050405020304" pitchFamily="18" charset="0"/>
+              </a:rPr>
+              <a:t>authentication systems may pose risks if compromised.</a:t>
             </a:r>
           </a:p>
           <a:p>
@@ -9882,134 +9964,67 @@
               <a:buChar char="v"/>
             </a:pPr>
             <a:r>
-              <a:rPr lang="en-IN" sz="2400" dirty="0" smtClean="0">
-                <a:latin typeface="Times New Roman" panose="02020603050405020304" pitchFamily="18" charset="0"/>
-                <a:cs typeface="Times New Roman" panose="02020603050405020304" pitchFamily="18" charset="0"/>
-              </a:rPr>
-              <a:t>[2]. </a:t>
-            </a:r>
-            <a:r>
-              <a:rPr lang="en-IN" sz="2400" dirty="0">
-                <a:latin typeface="Times New Roman" panose="02020603050405020304" pitchFamily="18" charset="0"/>
-                <a:cs typeface="Times New Roman" panose="02020603050405020304" pitchFamily="18" charset="0"/>
-              </a:rPr>
-              <a:t>Samira </a:t>
-            </a:r>
-            <a:r>
-              <a:rPr lang="en-IN" sz="2400" dirty="0" err="1">
-                <a:latin typeface="Times New Roman" panose="02020603050405020304" pitchFamily="18" charset="0"/>
-                <a:cs typeface="Times New Roman" panose="02020603050405020304" pitchFamily="18" charset="0"/>
-              </a:rPr>
-              <a:t>Prabhune</a:t>
-            </a:r>
-            <a:r>
-              <a:rPr lang="en-IN" sz="2400" dirty="0">
-                <a:latin typeface="Times New Roman" panose="02020603050405020304" pitchFamily="18" charset="0"/>
-                <a:cs typeface="Times New Roman" panose="02020603050405020304" pitchFamily="18" charset="0"/>
-              </a:rPr>
-              <a:t>, </a:t>
-            </a:r>
-            <a:r>
-              <a:rPr lang="en-IN" sz="2400" dirty="0" err="1">
-                <a:latin typeface="Times New Roman" panose="02020603050405020304" pitchFamily="18" charset="0"/>
-                <a:cs typeface="Times New Roman" panose="02020603050405020304" pitchFamily="18" charset="0"/>
-              </a:rPr>
-              <a:t>Sonal</a:t>
-            </a:r>
-            <a:r>
-              <a:rPr lang="en-IN" sz="2400" dirty="0">
-                <a:latin typeface="Times New Roman" panose="02020603050405020304" pitchFamily="18" charset="0"/>
-                <a:cs typeface="Times New Roman" panose="02020603050405020304" pitchFamily="18" charset="0"/>
-              </a:rPr>
-              <a:t> Sharma. IEEE (</a:t>
-            </a:r>
-            <a:r>
-              <a:rPr lang="en-IN" sz="2400" dirty="0">
-                <a:latin typeface="Times New Roman" panose="02020603050405020304" pitchFamily="18" charset="0"/>
-                <a:cs typeface="Times New Roman" panose="02020603050405020304" pitchFamily="18" charset="0"/>
-                <a:hlinkClick r:id="rId3"/>
-              </a:rPr>
-              <a:t>9725597</a:t>
-            </a:r>
-            <a:r>
-              <a:rPr lang="en-IN" sz="2400" dirty="0">
-                <a:latin typeface="Times New Roman" panose="02020603050405020304" pitchFamily="18" charset="0"/>
-                <a:cs typeface="Times New Roman" panose="02020603050405020304" pitchFamily="18" charset="0"/>
-              </a:rPr>
-              <a:t>). </a:t>
+              <a:rPr lang="en-US" sz="2400" dirty="0">
+                <a:latin typeface="Times New Roman" panose="02020603050405020304" pitchFamily="18" charset="0"/>
+                <a:cs typeface="Times New Roman" panose="02020603050405020304" pitchFamily="18" charset="0"/>
+              </a:rPr>
+              <a:t>Centralized </a:t>
             </a:r>
             <a:r>
               <a:rPr lang="en-US" sz="2400" dirty="0" smtClean="0">
                 <a:latin typeface="Times New Roman" panose="02020603050405020304" pitchFamily="18" charset="0"/>
                 <a:cs typeface="Times New Roman" panose="02020603050405020304" pitchFamily="18" charset="0"/>
               </a:rPr>
-              <a:t>End-to-End </a:t>
-            </a:r>
-            <a:r>
-              <a:rPr lang="en-US" sz="2400" dirty="0">
-                <a:latin typeface="Times New Roman" panose="02020603050405020304" pitchFamily="18" charset="0"/>
-                <a:cs typeface="Times New Roman" panose="02020603050405020304" pitchFamily="18" charset="0"/>
-              </a:rPr>
-              <a:t>Encryption for Chat App with Dynamic Encryption Key</a:t>
-            </a:r>
-          </a:p>
-          <a:p>
-            <a:pPr marL="285750" indent="-285750" algn="just">
+              <a:t>Server:</a:t>
+            </a:r>
+          </a:p>
+          <a:p>
+            <a:pPr lvl="1" algn="just">
               <a:lnSpc>
                 <a:spcPct val="150000"/>
               </a:lnSpc>
-              <a:buFont typeface="Wingdings" panose="05000000000000000000" pitchFamily="2" charset="2"/>
-              <a:buChar char="v"/>
             </a:pPr>
             <a:r>
-              <a:rPr lang="en-IN" sz="2400" dirty="0" smtClean="0">
-                <a:latin typeface="Times New Roman" panose="02020603050405020304" pitchFamily="18" charset="0"/>
-                <a:cs typeface="Times New Roman" panose="02020603050405020304" pitchFamily="18" charset="0"/>
-              </a:rPr>
-              <a:t>[3]. </a:t>
-            </a:r>
-            <a:r>
-              <a:rPr lang="sv-SE" sz="2400" dirty="0">
-                <a:latin typeface="Times New Roman" panose="02020603050405020304" pitchFamily="18" charset="0"/>
-                <a:cs typeface="Times New Roman" panose="02020603050405020304" pitchFamily="18" charset="0"/>
-              </a:rPr>
-              <a:t>Ammar Hammad Ali, Ali Makki Sagheer</a:t>
-            </a:r>
-            <a:r>
-              <a:rPr lang="en-IN" sz="2400" dirty="0">
-                <a:latin typeface="Times New Roman" panose="02020603050405020304" pitchFamily="18" charset="0"/>
-                <a:cs typeface="Times New Roman" panose="02020603050405020304" pitchFamily="18" charset="0"/>
-              </a:rPr>
-              <a:t>. IASJ (</a:t>
-            </a:r>
-            <a:r>
-              <a:rPr lang="en-IN" sz="2400" dirty="0">
-                <a:latin typeface="Times New Roman" panose="02020603050405020304" pitchFamily="18" charset="0"/>
-                <a:cs typeface="Times New Roman" panose="02020603050405020304" pitchFamily="18" charset="0"/>
-                <a:hlinkClick r:id="rId4"/>
-              </a:rPr>
-              <a:t>doi:10.25195/2017/4315</a:t>
-            </a:r>
-            <a:r>
-              <a:rPr lang="en-IN" sz="2400" dirty="0">
-                <a:latin typeface="Times New Roman" panose="02020603050405020304" pitchFamily="18" charset="0"/>
-                <a:cs typeface="Times New Roman" panose="02020603050405020304" pitchFamily="18" charset="0"/>
-              </a:rPr>
-              <a:t>) Vol.[43] Issue[1] 2017. </a:t>
+              <a:rPr lang="en-US" sz="2400" dirty="0" smtClean="0">
+                <a:latin typeface="Times New Roman" panose="02020603050405020304" pitchFamily="18" charset="0"/>
+                <a:cs typeface="Times New Roman" panose="02020603050405020304" pitchFamily="18" charset="0"/>
+              </a:rPr>
+              <a:t>Most </a:t>
             </a:r>
             <a:r>
               <a:rPr lang="en-US" sz="2400" dirty="0">
                 <a:latin typeface="Times New Roman" panose="02020603050405020304" pitchFamily="18" charset="0"/>
                 <a:cs typeface="Times New Roman" panose="02020603050405020304" pitchFamily="18" charset="0"/>
               </a:rPr>
-              <a:t>Design of Secure Chatting Application with End to End Encryption for Android </a:t>
-            </a:r>
+              <a:t>chat applications use a centralized server architecture.</a:t>
+            </a:r>
+          </a:p>
+          <a:p>
+            <a:pPr algn="just">
+              <a:lnSpc>
+                <a:spcPct val="150000"/>
+              </a:lnSpc>
+            </a:pPr>
             <a:r>
               <a:rPr lang="en-US" sz="2400" dirty="0" smtClean="0">
                 <a:latin typeface="Times New Roman" panose="02020603050405020304" pitchFamily="18" charset="0"/>
                 <a:cs typeface="Times New Roman" panose="02020603050405020304" pitchFamily="18" charset="0"/>
               </a:rPr>
-              <a:t>Platform</a:t>
+              <a:t>	This </a:t>
+            </a:r>
+            <a:r>
+              <a:rPr lang="en-US" sz="2400" dirty="0">
+                <a:latin typeface="Times New Roman" panose="02020603050405020304" pitchFamily="18" charset="0"/>
+                <a:cs typeface="Times New Roman" panose="02020603050405020304" pitchFamily="18" charset="0"/>
+              </a:rPr>
+              <a:t>introduces a single point of failure and potential security concerns</a:t>
+            </a:r>
+            <a:r>
+              <a:rPr lang="en-US" sz="2400" dirty="0" smtClean="0">
+                <a:latin typeface="Times New Roman" panose="02020603050405020304" pitchFamily="18" charset="0"/>
+                <a:cs typeface="Times New Roman" panose="02020603050405020304" pitchFamily="18" charset="0"/>
+              </a:rPr>
+              <a:t>.</a:t>
             </a:r>
             <a:endParaRPr lang="en-US" sz="2400" dirty="0">
               <a:latin typeface="Times New Roman" panose="02020603050405020304" pitchFamily="18" charset="0"/>
@@ -10107,8 +10122,8 @@
         </p:nvSpPr>
         <p:spPr>
           <a:xfrm>
-            <a:off x="649432" y="1508766"/>
-            <a:ext cx="10893136" cy="4524315"/>
+            <a:off x="649432" y="582361"/>
+            <a:ext cx="10893136" cy="6186309"/>
           </a:xfrm>
           <a:prstGeom prst="rect">
             <a:avLst/>
@@ -10129,62 +10144,76 @@
               <a:buChar char="v"/>
             </a:pPr>
             <a:r>
-              <a:rPr lang="en-IN" sz="2400" dirty="0">
-                <a:latin typeface="Times New Roman" panose="02020603050405020304" pitchFamily="18" charset="0"/>
-                <a:cs typeface="Times New Roman" panose="02020603050405020304" pitchFamily="18" charset="0"/>
-              </a:rPr>
-              <a:t>[1]. Mirza K. B. Shuhan1, Tariqul Islam2. </a:t>
-            </a:r>
-            <a:r>
-              <a:rPr lang="en-IN" sz="2400" dirty="0" smtClean="0">
-                <a:latin typeface="Times New Roman" panose="02020603050405020304" pitchFamily="18" charset="0"/>
-                <a:cs typeface="Times New Roman" panose="02020603050405020304" pitchFamily="18" charset="0"/>
-              </a:rPr>
-              <a:t>IEEE (</a:t>
-            </a:r>
-            <a:r>
-              <a:rPr lang="en-IN" sz="2400" dirty="0" smtClean="0">
-                <a:latin typeface="Times New Roman" panose="02020603050405020304" pitchFamily="18" charset="0"/>
-                <a:cs typeface="Times New Roman" panose="02020603050405020304" pitchFamily="18" charset="0"/>
-                <a:hlinkClick r:id="rId2"/>
-              </a:rPr>
-              <a:t>arXiv:2308.04452v1</a:t>
-            </a:r>
-            <a:r>
-              <a:rPr lang="en-IN" sz="2400" dirty="0" smtClean="0">
-                <a:latin typeface="Times New Roman" panose="02020603050405020304" pitchFamily="18" charset="0"/>
-                <a:cs typeface="Times New Roman" panose="02020603050405020304" pitchFamily="18" charset="0"/>
-              </a:rPr>
-              <a:t>) </a:t>
-            </a:r>
-            <a:r>
-              <a:rPr lang="en-IN" sz="2400" dirty="0">
-                <a:latin typeface="Times New Roman" panose="02020603050405020304" pitchFamily="18" charset="0"/>
-                <a:cs typeface="Times New Roman" panose="02020603050405020304" pitchFamily="18" charset="0"/>
-              </a:rPr>
-              <a:t>[cs.CR] 5 Aug 2023. </a:t>
-            </a:r>
-            <a:r>
               <a:rPr lang="en-US" sz="2400" dirty="0">
                 <a:latin typeface="Times New Roman" panose="02020603050405020304" pitchFamily="18" charset="0"/>
                 <a:cs typeface="Times New Roman" panose="02020603050405020304" pitchFamily="18" charset="0"/>
               </a:rPr>
-              <a:t>Quarks: A Secure and </a:t>
+              <a:t>End-to-End Encryption</a:t>
             </a:r>
             <a:r>
               <a:rPr lang="en-US" sz="2400" dirty="0" smtClean="0">
                 <a:latin typeface="Times New Roman" panose="02020603050405020304" pitchFamily="18" charset="0"/>
                 <a:cs typeface="Times New Roman" panose="02020603050405020304" pitchFamily="18" charset="0"/>
               </a:rPr>
-              <a:t>Decentralized Block-chain Based </a:t>
+              <a:t>:</a:t>
+            </a:r>
+            <a:endParaRPr lang="en-US" sz="2400" dirty="0">
+              <a:latin typeface="Times New Roman" panose="02020603050405020304" pitchFamily="18" charset="0"/>
+              <a:cs typeface="Times New Roman" panose="02020603050405020304" pitchFamily="18" charset="0"/>
+            </a:endParaRPr>
+          </a:p>
+          <a:p>
+            <a:pPr algn="just">
+              <a:lnSpc>
+                <a:spcPct val="150000"/>
+              </a:lnSpc>
+            </a:pPr>
+            <a:r>
+              <a:rPr lang="en-US" sz="2400" dirty="0" smtClean="0">
+                <a:latin typeface="Times New Roman" panose="02020603050405020304" pitchFamily="18" charset="0"/>
+                <a:cs typeface="Times New Roman" panose="02020603050405020304" pitchFamily="18" charset="0"/>
+              </a:rPr>
+              <a:t>	Implements </a:t>
             </a:r>
             <a:r>
               <a:rPr lang="en-US" sz="2400" dirty="0">
                 <a:latin typeface="Times New Roman" panose="02020603050405020304" pitchFamily="18" charset="0"/>
                 <a:cs typeface="Times New Roman" panose="02020603050405020304" pitchFamily="18" charset="0"/>
               </a:rPr>
-              <a:t>Messaging Network</a:t>
-            </a:r>
+              <a:t>robust end-to-end encryption algorithms for secure communication.</a:t>
+            </a:r>
+          </a:p>
+          <a:p>
+            <a:pPr algn="just">
+              <a:lnSpc>
+                <a:spcPct val="150000"/>
+              </a:lnSpc>
+            </a:pPr>
+            <a:r>
+              <a:rPr lang="en-US" sz="2400" dirty="0" smtClean="0">
+                <a:latin typeface="Times New Roman" panose="02020603050405020304" pitchFamily="18" charset="0"/>
+                <a:cs typeface="Times New Roman" panose="02020603050405020304" pitchFamily="18" charset="0"/>
+              </a:rPr>
+              <a:t>	Ensures </a:t>
+            </a:r>
+            <a:r>
+              <a:rPr lang="en-US" sz="2400" dirty="0">
+                <a:latin typeface="Times New Roman" panose="02020603050405020304" pitchFamily="18" charset="0"/>
+                <a:cs typeface="Times New Roman" panose="02020603050405020304" pitchFamily="18" charset="0"/>
+              </a:rPr>
+              <a:t>that only the intended recipients can decrypt and access messages</a:t>
+            </a:r>
+            <a:r>
+              <a:rPr lang="en-US" sz="2400" dirty="0" smtClean="0">
+                <a:latin typeface="Times New Roman" panose="02020603050405020304" pitchFamily="18" charset="0"/>
+                <a:cs typeface="Times New Roman" panose="02020603050405020304" pitchFamily="18" charset="0"/>
+              </a:rPr>
+              <a:t>.</a:t>
+            </a:r>
+            <a:endParaRPr lang="en-US" sz="2400" dirty="0">
+              <a:latin typeface="Times New Roman" panose="02020603050405020304" pitchFamily="18" charset="0"/>
+              <a:cs typeface="Times New Roman" panose="02020603050405020304" pitchFamily="18" charset="0"/>
+            </a:endParaRPr>
           </a:p>
           <a:p>
             <a:pPr marL="285750" indent="-285750" algn="just">
@@ -10195,76 +10224,111 @@
               <a:buChar char="v"/>
             </a:pPr>
             <a:r>
-              <a:rPr lang="en-IN" sz="2400" dirty="0" smtClean="0">
-                <a:latin typeface="Times New Roman" panose="02020603050405020304" pitchFamily="18" charset="0"/>
-                <a:cs typeface="Times New Roman" panose="02020603050405020304" pitchFamily="18" charset="0"/>
-              </a:rPr>
-              <a:t>[2]. </a:t>
-            </a:r>
-            <a:r>
-              <a:rPr lang="en-IN" sz="2400" dirty="0">
-                <a:latin typeface="Times New Roman" panose="02020603050405020304" pitchFamily="18" charset="0"/>
-                <a:cs typeface="Times New Roman" panose="02020603050405020304" pitchFamily="18" charset="0"/>
-              </a:rPr>
-              <a:t>Samira </a:t>
-            </a:r>
-            <a:r>
-              <a:rPr lang="en-IN" sz="2400" dirty="0" err="1">
-                <a:latin typeface="Times New Roman" panose="02020603050405020304" pitchFamily="18" charset="0"/>
-                <a:cs typeface="Times New Roman" panose="02020603050405020304" pitchFamily="18" charset="0"/>
-              </a:rPr>
-              <a:t>Prabhune</a:t>
-            </a:r>
-            <a:r>
-              <a:rPr lang="en-IN" sz="2400" dirty="0">
-                <a:latin typeface="Times New Roman" panose="02020603050405020304" pitchFamily="18" charset="0"/>
-                <a:cs typeface="Times New Roman" panose="02020603050405020304" pitchFamily="18" charset="0"/>
-              </a:rPr>
-              <a:t>, </a:t>
-            </a:r>
-            <a:r>
-              <a:rPr lang="en-IN" sz="2400" dirty="0" err="1">
-                <a:latin typeface="Times New Roman" panose="02020603050405020304" pitchFamily="18" charset="0"/>
-                <a:cs typeface="Times New Roman" panose="02020603050405020304" pitchFamily="18" charset="0"/>
-              </a:rPr>
-              <a:t>Sonal</a:t>
-            </a:r>
-            <a:r>
-              <a:rPr lang="en-IN" sz="2400" dirty="0">
-                <a:latin typeface="Times New Roman" panose="02020603050405020304" pitchFamily="18" charset="0"/>
-                <a:cs typeface="Times New Roman" panose="02020603050405020304" pitchFamily="18" charset="0"/>
-              </a:rPr>
-              <a:t> Sharma. IEEE (</a:t>
-            </a:r>
-            <a:r>
-              <a:rPr lang="en-IN" sz="2400" dirty="0">
-                <a:latin typeface="Times New Roman" panose="02020603050405020304" pitchFamily="18" charset="0"/>
-                <a:cs typeface="Times New Roman" panose="02020603050405020304" pitchFamily="18" charset="0"/>
-                <a:hlinkClick r:id="rId3"/>
-              </a:rPr>
-              <a:t>9725597</a:t>
-            </a:r>
-            <a:r>
-              <a:rPr lang="en-IN" sz="2400" dirty="0">
-                <a:latin typeface="Times New Roman" panose="02020603050405020304" pitchFamily="18" charset="0"/>
-                <a:cs typeface="Times New Roman" panose="02020603050405020304" pitchFamily="18" charset="0"/>
-              </a:rPr>
-              <a:t>). </a:t>
-            </a:r>
-            <a:r>
               <a:rPr lang="en-US" sz="2400" dirty="0" smtClean="0">
                 <a:latin typeface="Times New Roman" panose="02020603050405020304" pitchFamily="18" charset="0"/>
                 <a:cs typeface="Times New Roman" panose="02020603050405020304" pitchFamily="18" charset="0"/>
               </a:rPr>
-              <a:t>End-to-End </a:t>
+              <a:t>Block-chain </a:t>
             </a:r>
             <a:r>
               <a:rPr lang="en-US" sz="2400" dirty="0">
                 <a:latin typeface="Times New Roman" panose="02020603050405020304" pitchFamily="18" charset="0"/>
                 <a:cs typeface="Times New Roman" panose="02020603050405020304" pitchFamily="18" charset="0"/>
               </a:rPr>
-              <a:t>Encryption for Chat App with Dynamic Encryption Key</a:t>
-            </a:r>
+              <a:t>Authentication</a:t>
+            </a:r>
+            <a:r>
+              <a:rPr lang="en-US" sz="2400" dirty="0" smtClean="0">
+                <a:latin typeface="Times New Roman" panose="02020603050405020304" pitchFamily="18" charset="0"/>
+                <a:cs typeface="Times New Roman" panose="02020603050405020304" pitchFamily="18" charset="0"/>
+              </a:rPr>
+              <a:t>:</a:t>
+            </a:r>
+            <a:endParaRPr lang="en-US" sz="2400" dirty="0">
+              <a:latin typeface="Times New Roman" panose="02020603050405020304" pitchFamily="18" charset="0"/>
+              <a:cs typeface="Times New Roman" panose="02020603050405020304" pitchFamily="18" charset="0"/>
+            </a:endParaRPr>
+          </a:p>
+          <a:p>
+            <a:pPr algn="just">
+              <a:lnSpc>
+                <a:spcPct val="150000"/>
+              </a:lnSpc>
+            </a:pPr>
+            <a:r>
+              <a:rPr lang="en-US" sz="2400" dirty="0" smtClean="0">
+                <a:latin typeface="Times New Roman" panose="02020603050405020304" pitchFamily="18" charset="0"/>
+                <a:cs typeface="Times New Roman" panose="02020603050405020304" pitchFamily="18" charset="0"/>
+              </a:rPr>
+              <a:t>	Leverages block-chain </a:t>
+            </a:r>
+            <a:r>
+              <a:rPr lang="en-US" sz="2400" dirty="0">
+                <a:latin typeface="Times New Roman" panose="02020603050405020304" pitchFamily="18" charset="0"/>
+                <a:cs typeface="Times New Roman" panose="02020603050405020304" pitchFamily="18" charset="0"/>
+              </a:rPr>
+              <a:t>for user authentication.</a:t>
+            </a:r>
+          </a:p>
+          <a:p>
+            <a:pPr algn="just">
+              <a:lnSpc>
+                <a:spcPct val="150000"/>
+              </a:lnSpc>
+            </a:pPr>
+            <a:r>
+              <a:rPr lang="en-US" sz="2400" dirty="0" smtClean="0">
+                <a:latin typeface="Times New Roman" panose="02020603050405020304" pitchFamily="18" charset="0"/>
+                <a:cs typeface="Times New Roman" panose="02020603050405020304" pitchFamily="18" charset="0"/>
+              </a:rPr>
+              <a:t>	Each </a:t>
+            </a:r>
+            <a:r>
+              <a:rPr lang="en-US" sz="2400" dirty="0">
+                <a:latin typeface="Times New Roman" panose="02020603050405020304" pitchFamily="18" charset="0"/>
+                <a:cs typeface="Times New Roman" panose="02020603050405020304" pitchFamily="18" charset="0"/>
+              </a:rPr>
+              <a:t>user has a unique identifier on the </a:t>
+            </a:r>
+            <a:r>
+              <a:rPr lang="en-US" sz="2400" dirty="0" smtClean="0">
+                <a:latin typeface="Times New Roman" panose="02020603050405020304" pitchFamily="18" charset="0"/>
+                <a:cs typeface="Times New Roman" panose="02020603050405020304" pitchFamily="18" charset="0"/>
+              </a:rPr>
+              <a:t>block-chain</a:t>
+            </a:r>
+            <a:r>
+              <a:rPr lang="en-US" sz="2400" dirty="0">
+                <a:latin typeface="Times New Roman" panose="02020603050405020304" pitchFamily="18" charset="0"/>
+                <a:cs typeface="Times New Roman" panose="02020603050405020304" pitchFamily="18" charset="0"/>
+              </a:rPr>
+              <a:t>, enhancing security and </a:t>
+            </a:r>
+            <a:r>
+              <a:rPr lang="en-US" sz="2400" dirty="0" smtClean="0">
+                <a:latin typeface="Times New Roman" panose="02020603050405020304" pitchFamily="18" charset="0"/>
+                <a:cs typeface="Times New Roman" panose="02020603050405020304" pitchFamily="18" charset="0"/>
+              </a:rPr>
+              <a:t>	decentralizing </a:t>
+            </a:r>
+            <a:r>
+              <a:rPr lang="en-US" sz="2400" dirty="0">
+                <a:latin typeface="Times New Roman" panose="02020603050405020304" pitchFamily="18" charset="0"/>
+                <a:cs typeface="Times New Roman" panose="02020603050405020304" pitchFamily="18" charset="0"/>
+              </a:rPr>
+              <a:t>user management</a:t>
+            </a:r>
+            <a:r>
+              <a:rPr lang="en-US" sz="2400" dirty="0" smtClean="0">
+                <a:latin typeface="Times New Roman" panose="02020603050405020304" pitchFamily="18" charset="0"/>
+                <a:cs typeface="Times New Roman" panose="02020603050405020304" pitchFamily="18" charset="0"/>
+              </a:rPr>
+              <a:t>.</a:t>
+            </a:r>
+            <a:endParaRPr lang="en-US" sz="2400" dirty="0">
+              <a:latin typeface="Times New Roman" panose="02020603050405020304" pitchFamily="18" charset="0"/>
+              <a:cs typeface="Times New Roman" panose="02020603050405020304" pitchFamily="18" charset="0"/>
+            </a:endParaRPr>
           </a:p>
           <a:p>
             <a:pPr marL="285750" indent="-285750" algn="just">
@@ -10275,54 +10339,78 @@
               <a:buChar char="v"/>
             </a:pPr>
             <a:r>
-              <a:rPr lang="en-IN" sz="2400" dirty="0" smtClean="0">
-                <a:latin typeface="Times New Roman" panose="02020603050405020304" pitchFamily="18" charset="0"/>
-                <a:cs typeface="Times New Roman" panose="02020603050405020304" pitchFamily="18" charset="0"/>
-              </a:rPr>
-              <a:t>[3]. </a:t>
-            </a:r>
-            <a:r>
-              <a:rPr lang="sv-SE" sz="2400" dirty="0">
-                <a:latin typeface="Times New Roman" panose="02020603050405020304" pitchFamily="18" charset="0"/>
-                <a:cs typeface="Times New Roman" panose="02020603050405020304" pitchFamily="18" charset="0"/>
-              </a:rPr>
-              <a:t>Ammar Hammad Ali, Ali Makki Sagheer</a:t>
-            </a:r>
-            <a:r>
-              <a:rPr lang="en-IN" sz="2400" dirty="0">
-                <a:latin typeface="Times New Roman" panose="02020603050405020304" pitchFamily="18" charset="0"/>
-                <a:cs typeface="Times New Roman" panose="02020603050405020304" pitchFamily="18" charset="0"/>
-              </a:rPr>
-              <a:t>. IASJ (</a:t>
-            </a:r>
-            <a:r>
-              <a:rPr lang="en-IN" sz="2400" dirty="0">
-                <a:latin typeface="Times New Roman" panose="02020603050405020304" pitchFamily="18" charset="0"/>
-                <a:cs typeface="Times New Roman" panose="02020603050405020304" pitchFamily="18" charset="0"/>
-                <a:hlinkClick r:id="rId4"/>
-              </a:rPr>
-              <a:t>doi:10.25195/2017/4315</a:t>
-            </a:r>
-            <a:r>
-              <a:rPr lang="en-IN" sz="2400" dirty="0">
-                <a:latin typeface="Times New Roman" panose="02020603050405020304" pitchFamily="18" charset="0"/>
-                <a:cs typeface="Times New Roman" panose="02020603050405020304" pitchFamily="18" charset="0"/>
-              </a:rPr>
-              <a:t>) Vol.[43] Issue[1] 2017. </a:t>
-            </a:r>
-            <a:r>
               <a:rPr lang="en-US" sz="2400" dirty="0">
                 <a:latin typeface="Times New Roman" panose="02020603050405020304" pitchFamily="18" charset="0"/>
                 <a:cs typeface="Times New Roman" panose="02020603050405020304" pitchFamily="18" charset="0"/>
               </a:rPr>
-              <a:t>Design of Secure Chatting Application with End to End Encryption for Android </a:t>
+              <a:t>Decentralized Message Integrity</a:t>
             </a:r>
             <a:r>
               <a:rPr lang="en-US" sz="2400" dirty="0" smtClean="0">
                 <a:latin typeface="Times New Roman" panose="02020603050405020304" pitchFamily="18" charset="0"/>
                 <a:cs typeface="Times New Roman" panose="02020603050405020304" pitchFamily="18" charset="0"/>
               </a:rPr>
-              <a:t>Platform</a:t>
+              <a:t>:</a:t>
+            </a:r>
+            <a:endParaRPr lang="en-US" sz="2400" dirty="0">
+              <a:latin typeface="Times New Roman" panose="02020603050405020304" pitchFamily="18" charset="0"/>
+              <a:cs typeface="Times New Roman" panose="02020603050405020304" pitchFamily="18" charset="0"/>
+            </a:endParaRPr>
+          </a:p>
+          <a:p>
+            <a:pPr algn="just">
+              <a:lnSpc>
+                <a:spcPct val="150000"/>
+              </a:lnSpc>
+            </a:pPr>
+            <a:r>
+              <a:rPr lang="en-US" sz="2400" dirty="0" smtClean="0">
+                <a:latin typeface="Times New Roman" panose="02020603050405020304" pitchFamily="18" charset="0"/>
+                <a:cs typeface="Times New Roman" panose="02020603050405020304" pitchFamily="18" charset="0"/>
+              </a:rPr>
+              <a:t>	Uses block-chain </a:t>
+            </a:r>
+            <a:r>
+              <a:rPr lang="en-US" sz="2400" dirty="0">
+                <a:latin typeface="Times New Roman" panose="02020603050405020304" pitchFamily="18" charset="0"/>
+                <a:cs typeface="Times New Roman" panose="02020603050405020304" pitchFamily="18" charset="0"/>
+              </a:rPr>
+              <a:t>as a distributed ledger for storing message metadata.</a:t>
+            </a:r>
+          </a:p>
+          <a:p>
+            <a:pPr algn="just">
+              <a:lnSpc>
+                <a:spcPct val="150000"/>
+              </a:lnSpc>
+            </a:pPr>
+            <a:r>
+              <a:rPr lang="en-US" sz="2400" dirty="0" smtClean="0">
+                <a:latin typeface="Times New Roman" panose="02020603050405020304" pitchFamily="18" charset="0"/>
+                <a:cs typeface="Times New Roman" panose="02020603050405020304" pitchFamily="18" charset="0"/>
+              </a:rPr>
+              <a:t>	Ensures </a:t>
+            </a:r>
+            <a:r>
+              <a:rPr lang="en-US" sz="2400" dirty="0">
+                <a:latin typeface="Times New Roman" panose="02020603050405020304" pitchFamily="18" charset="0"/>
+                <a:cs typeface="Times New Roman" panose="02020603050405020304" pitchFamily="18" charset="0"/>
+              </a:rPr>
+              <a:t>the integrity and tamper-resistance of messages with timestamping on the </a:t>
+            </a:r>
+            <a:r>
+              <a:rPr lang="en-US" sz="2400" dirty="0" smtClean="0">
+                <a:latin typeface="Times New Roman" panose="02020603050405020304" pitchFamily="18" charset="0"/>
+                <a:cs typeface="Times New Roman" panose="02020603050405020304" pitchFamily="18" charset="0"/>
+              </a:rPr>
+              <a:t>	block-chain</a:t>
+            </a:r>
+            <a:r>
+              <a:rPr lang="en-US" sz="2400" dirty="0">
+                <a:latin typeface="Times New Roman" panose="02020603050405020304" pitchFamily="18" charset="0"/>
+                <a:cs typeface="Times New Roman" panose="02020603050405020304" pitchFamily="18" charset="0"/>
+              </a:rPr>
+              <a:t>.</a:t>
             </a:r>
             <a:endParaRPr lang="en-US" sz="2400" dirty="0">
               <a:latin typeface="Times New Roman" panose="02020603050405020304" pitchFamily="18" charset="0"/>

</xml_diff>

<commit_message>
Software freeze bug fixed
</commit_message>
<xml_diff>
--- a/DOCS/First Review.pptx
+++ b/DOCS/First Review.pptx
@@ -252,7 +252,7 @@
             <a:fld id="{1BC5A6D6-678F-47D8-91DE-2A07AB82649C}" type="datetimeFigureOut">
               <a:rPr lang="en-US" smtClean="0"/>
               <a:pPr/>
-              <a:t>3/14/2024</a:t>
+              <a:t>3/18/2024</a:t>
             </a:fld>
             <a:endParaRPr lang="en-US"/>
           </a:p>
@@ -779,7 +779,7 @@
             <a:fld id="{CF705531-103C-4EA6-8A04-8B669A93EC46}" type="datetimeFigureOut">
               <a:rPr lang="en-US" smtClean="0"/>
               <a:pPr/>
-              <a:t>3/14/2024</a:t>
+              <a:t>3/18/2024</a:t>
             </a:fld>
             <a:endParaRPr lang="en-US"/>
           </a:p>
@@ -944,7 +944,7 @@
             <a:fld id="{CF705531-103C-4EA6-8A04-8B669A93EC46}" type="datetimeFigureOut">
               <a:rPr lang="en-US" smtClean="0"/>
               <a:pPr/>
-              <a:t>3/14/2024</a:t>
+              <a:t>3/18/2024</a:t>
             </a:fld>
             <a:endParaRPr lang="en-US"/>
           </a:p>
@@ -1119,7 +1119,7 @@
             <a:fld id="{CF705531-103C-4EA6-8A04-8B669A93EC46}" type="datetimeFigureOut">
               <a:rPr lang="en-US" smtClean="0"/>
               <a:pPr/>
-              <a:t>3/14/2024</a:t>
+              <a:t>3/18/2024</a:t>
             </a:fld>
             <a:endParaRPr lang="en-US"/>
           </a:p>
@@ -1284,7 +1284,7 @@
             <a:fld id="{CF705531-103C-4EA6-8A04-8B669A93EC46}" type="datetimeFigureOut">
               <a:rPr lang="en-US" smtClean="0"/>
               <a:pPr/>
-              <a:t>3/14/2024</a:t>
+              <a:t>3/18/2024</a:t>
             </a:fld>
             <a:endParaRPr lang="en-US"/>
           </a:p>
@@ -1526,7 +1526,7 @@
             <a:fld id="{CF705531-103C-4EA6-8A04-8B669A93EC46}" type="datetimeFigureOut">
               <a:rPr lang="en-US" smtClean="0"/>
               <a:pPr/>
-              <a:t>3/14/2024</a:t>
+              <a:t>3/18/2024</a:t>
             </a:fld>
             <a:endParaRPr lang="en-US"/>
           </a:p>
@@ -1808,7 +1808,7 @@
             <a:fld id="{CF705531-103C-4EA6-8A04-8B669A93EC46}" type="datetimeFigureOut">
               <a:rPr lang="en-US" smtClean="0"/>
               <a:pPr/>
-              <a:t>3/14/2024</a:t>
+              <a:t>3/18/2024</a:t>
             </a:fld>
             <a:endParaRPr lang="en-US"/>
           </a:p>
@@ -2229,7 +2229,7 @@
             <a:fld id="{CF705531-103C-4EA6-8A04-8B669A93EC46}" type="datetimeFigureOut">
               <a:rPr lang="en-US" smtClean="0"/>
               <a:pPr/>
-              <a:t>3/14/2024</a:t>
+              <a:t>3/18/2024</a:t>
             </a:fld>
             <a:endParaRPr lang="en-US"/>
           </a:p>
@@ -2343,7 +2343,7 @@
             <a:fld id="{CF705531-103C-4EA6-8A04-8B669A93EC46}" type="datetimeFigureOut">
               <a:rPr lang="en-US" smtClean="0"/>
               <a:pPr/>
-              <a:t>3/14/2024</a:t>
+              <a:t>3/18/2024</a:t>
             </a:fld>
             <a:endParaRPr lang="en-US"/>
           </a:p>
@@ -2435,7 +2435,7 @@
             <a:fld id="{CF705531-103C-4EA6-8A04-8B669A93EC46}" type="datetimeFigureOut">
               <a:rPr lang="en-US" smtClean="0"/>
               <a:pPr/>
-              <a:t>3/14/2024</a:t>
+              <a:t>3/18/2024</a:t>
             </a:fld>
             <a:endParaRPr lang="en-US"/>
           </a:p>
@@ -2707,7 +2707,7 @@
             <a:fld id="{CF705531-103C-4EA6-8A04-8B669A93EC46}" type="datetimeFigureOut">
               <a:rPr lang="en-US" smtClean="0"/>
               <a:pPr/>
-              <a:t>3/14/2024</a:t>
+              <a:t>3/18/2024</a:t>
             </a:fld>
             <a:endParaRPr lang="en-US"/>
           </a:p>
@@ -2956,7 +2956,7 @@
             <a:fld id="{CF705531-103C-4EA6-8A04-8B669A93EC46}" type="datetimeFigureOut">
               <a:rPr lang="en-US" smtClean="0"/>
               <a:pPr/>
-              <a:t>3/14/2024</a:t>
+              <a:t>3/18/2024</a:t>
             </a:fld>
             <a:endParaRPr lang="en-US"/>
           </a:p>
@@ -3164,7 +3164,7 @@
             <a:fld id="{CF705531-103C-4EA6-8A04-8B669A93EC46}" type="datetimeFigureOut">
               <a:rPr lang="en-US" smtClean="0"/>
               <a:pPr/>
-              <a:t>3/14/2024</a:t>
+              <a:t>3/18/2024</a:t>
             </a:fld>
             <a:endParaRPr lang="en-US"/>
           </a:p>
@@ -3979,7 +3979,11 @@
             <a:graphicFrameLocks noGrp="1"/>
           </p:cNvGraphicFramePr>
           <p:nvPr>
-            <p:extLst/>
+            <p:extLst>
+              <p:ext uri="{D42A27DB-BD31-4B8C-83A1-F6EECF244321}">
+                <p14:modId xmlns:p14="http://schemas.microsoft.com/office/powerpoint/2010/main" val="3345364772"/>
+              </p:ext>
+            </p:extLst>
           </p:nvPr>
         </p:nvGraphicFramePr>
         <p:xfrm>
@@ -4406,7 +4410,7 @@
                           <a:latin typeface="Times New Roman" panose="02020603050405020304" pitchFamily="18" charset="0"/>
                           <a:cs typeface="Times New Roman" panose="02020603050405020304" pitchFamily="18" charset="0"/>
                         </a:rPr>
-                        <a:t>Disadvantaged</a:t>
+                        <a:t>Disadvantages</a:t>
                       </a:r>
                       <a:endParaRPr lang="en-US" dirty="0">
                         <a:solidFill>
@@ -4625,10 +4629,6 @@
                         </a:rPr>
                         <a:t>Developing of Middleware and Cross Platform Chat Application</a:t>
                       </a:r>
-                      <a:endParaRPr lang="en-US" sz="1800" dirty="0" smtClean="0">
-                        <a:latin typeface="Times New Roman" panose="02020603050405020304" pitchFamily="18" charset="0"/>
-                        <a:cs typeface="Times New Roman" panose="02020603050405020304" pitchFamily="18" charset="0"/>
-                      </a:endParaRPr>
                     </a:p>
                   </a:txBody>
                   <a:tcPr anchor="ctr">
@@ -4760,7 +4760,10 @@
                     <a:p>
                       <a:pPr algn="ctr"/>
                       <a:r>
-                        <a:rPr lang="en-US" baseline="0" dirty="0" smtClean="0"/>
+                        <a:rPr lang="en-US" baseline="0" dirty="0" smtClean="0">
+                          <a:latin typeface="Times New Roman" panose="02020603050405020304" pitchFamily="18" charset="0"/>
+                          <a:cs typeface="Times New Roman" panose="02020603050405020304" pitchFamily="18" charset="0"/>
+                        </a:rPr>
                         <a:t>Line Messaging API</a:t>
                       </a:r>
                       <a:endParaRPr lang="en-US" dirty="0">
@@ -5172,9 +5175,9 @@
                             <a:schemeClr val="dk1"/>
                           </a:solidFill>
                           <a:effectLst/>
-                          <a:latin typeface="+mn-lt"/>
+                          <a:latin typeface="Times New Roman" panose="02020603050405020304" pitchFamily="18" charset="0"/>
                           <a:ea typeface="+mn-ea"/>
-                          <a:cs typeface="+mn-cs"/>
+                          <a:cs typeface="Times New Roman" panose="02020603050405020304" pitchFamily="18" charset="0"/>
                         </a:rPr>
                         <a:t>This dissertation investigates whether it is possible to perform end-to-end encryption over an </a:t>
                       </a:r>
@@ -5184,9 +5187,9 @@
                             <a:schemeClr val="dk1"/>
                           </a:solidFill>
                           <a:effectLst/>
-                          <a:latin typeface="+mn-lt"/>
+                          <a:latin typeface="Times New Roman" panose="02020603050405020304" pitchFamily="18" charset="0"/>
                           <a:ea typeface="+mn-ea"/>
-                          <a:cs typeface="+mn-cs"/>
+                          <a:cs typeface="Times New Roman" panose="02020603050405020304" pitchFamily="18" charset="0"/>
                         </a:rPr>
                         <a:t>arbitrary</a:t>
                       </a:r>
@@ -5196,21 +5199,12 @@
                             <a:schemeClr val="dk1"/>
                           </a:solidFill>
                           <a:effectLst/>
-                          <a:latin typeface="+mn-lt"/>
+                          <a:latin typeface="Times New Roman" panose="02020603050405020304" pitchFamily="18" charset="0"/>
                           <a:ea typeface="+mn-ea"/>
-                          <a:cs typeface="+mn-cs"/>
+                          <a:cs typeface="Times New Roman" panose="02020603050405020304" pitchFamily="18" charset="0"/>
                         </a:rPr>
                         <a:t> Instant Messaging Platform (IM-P), placing no implicit trust in such platform itself.</a:t>
                       </a:r>
-                      <a:endParaRPr lang="en-US" sz="1800" b="0" i="0" kern="1200" dirty="0" smtClean="0">
-                        <a:solidFill>
-                          <a:schemeClr val="dk1"/>
-                        </a:solidFill>
-                        <a:effectLst/>
-                        <a:latin typeface="+mn-lt"/>
-                        <a:ea typeface="+mn-ea"/>
-                        <a:cs typeface="+mn-cs"/>
-                      </a:endParaRPr>
                     </a:p>
                   </a:txBody>
                   <a:tcPr anchor="ctr">
@@ -5265,9 +5259,9 @@
                             <a:schemeClr val="dk1"/>
                           </a:solidFill>
                           <a:effectLst/>
-                          <a:latin typeface="+mn-lt"/>
+                          <a:latin typeface="Times New Roman" panose="02020603050405020304" pitchFamily="18" charset="0"/>
                           <a:ea typeface="+mn-ea"/>
-                          <a:cs typeface="+mn-cs"/>
+                          <a:cs typeface="Times New Roman" panose="02020603050405020304" pitchFamily="18" charset="0"/>
                         </a:rPr>
                         <a:t>Instant Messaging IM</a:t>
                       </a:r>
@@ -5422,25 +5416,8 @@
                           <a:latin typeface="Times New Roman" panose="02020603050405020304" pitchFamily="18" charset="0"/>
                           <a:cs typeface="Times New Roman" panose="02020603050405020304" pitchFamily="18" charset="0"/>
                         </a:rPr>
-                        <a:t>m </a:t>
-                      </a:r>
-                      <a:r>
-                        <a:rPr lang="en-US" baseline="0" dirty="0" smtClean="0">
-                          <a:solidFill>
-                            <a:schemeClr val="tx1"/>
-                          </a:solidFill>
-                          <a:latin typeface="Times New Roman" panose="02020603050405020304" pitchFamily="18" charset="0"/>
-                          <a:cs typeface="Times New Roman" panose="02020603050405020304" pitchFamily="18" charset="0"/>
-                        </a:rPr>
-                        <a:t>Dependent</a:t>
-                      </a:r>
-                      <a:endParaRPr lang="en-US" baseline="0" dirty="0" smtClean="0">
-                        <a:solidFill>
-                          <a:schemeClr val="tx1"/>
-                        </a:solidFill>
-                        <a:latin typeface="Times New Roman" panose="02020603050405020304" pitchFamily="18" charset="0"/>
-                        <a:cs typeface="Times New Roman" panose="02020603050405020304" pitchFamily="18" charset="0"/>
-                      </a:endParaRPr>
+                        <a:t>m Dependent</a:t>
+                      </a:r>
                     </a:p>
                   </a:txBody>
                   <a:tcPr anchor="ctr">
@@ -5504,7 +5481,7 @@
     <a:masterClrMapping/>
   </p:clrMapOvr>
   <p:transition spd="slow">
-    <p:wipe/>
+    <p:push dir="u"/>
   </p:transition>
   <p:timing>
     <p:tnLst>
@@ -5740,7 +5717,14 @@
                 <a:latin typeface="Times New Roman" panose="02020603050405020304" pitchFamily="18" charset="0"/>
                 <a:cs typeface="Times New Roman" panose="02020603050405020304" pitchFamily="18" charset="0"/>
               </a:rPr>
-              <a:t>authentication systems may pose risks if compromised.</a:t>
+              <a:t>authentication systems may pose risks if compromised</a:t>
+            </a:r>
+            <a:r>
+              <a:rPr lang="en-US" sz="2400" dirty="0" smtClean="0">
+                <a:latin typeface="Times New Roman" panose="02020603050405020304" pitchFamily="18" charset="0"/>
+                <a:cs typeface="Times New Roman" panose="02020603050405020304" pitchFamily="18" charset="0"/>
+              </a:rPr>
+              <a:t>.</a:t>
             </a:r>
           </a:p>
           <a:p>
@@ -5752,18 +5736,25 @@
               <a:buChar char="v"/>
             </a:pPr>
             <a:r>
+              <a:rPr lang="en-US" sz="2400" dirty="0" smtClean="0">
+                <a:latin typeface="Times New Roman" panose="02020603050405020304" pitchFamily="18" charset="0"/>
+                <a:cs typeface="Times New Roman" panose="02020603050405020304" pitchFamily="18" charset="0"/>
+              </a:rPr>
+              <a:t>De</a:t>
+            </a:r>
+            <a:r>
               <a:rPr lang="en-US" sz="2400" dirty="0">
                 <a:latin typeface="Times New Roman" panose="02020603050405020304" pitchFamily="18" charset="0"/>
                 <a:cs typeface="Times New Roman" panose="02020603050405020304" pitchFamily="18" charset="0"/>
               </a:rPr>
-              <a:t>Centralized </a:t>
+              <a:t>c</a:t>
             </a:r>
             <a:r>
               <a:rPr lang="en-US" sz="2400" dirty="0" smtClean="0">
                 <a:latin typeface="Times New Roman" panose="02020603050405020304" pitchFamily="18" charset="0"/>
                 <a:cs typeface="Times New Roman" panose="02020603050405020304" pitchFamily="18" charset="0"/>
               </a:rPr>
-              <a:t>Server:</a:t>
+              <a:t>entralized Server:</a:t>
             </a:r>
           </a:p>
           <a:p>
@@ -5784,7 +5775,21 @@
                 <a:latin typeface="Times New Roman" panose="02020603050405020304" pitchFamily="18" charset="0"/>
                 <a:cs typeface="Times New Roman" panose="02020603050405020304" pitchFamily="18" charset="0"/>
               </a:rPr>
-              <a:t>chat applications use a centralized server architecture.</a:t>
+              <a:t>chat applications use a </a:t>
+            </a:r>
+            <a:r>
+              <a:rPr lang="en-US" sz="2400" dirty="0" smtClean="0">
+                <a:latin typeface="Times New Roman" panose="02020603050405020304" pitchFamily="18" charset="0"/>
+                <a:cs typeface="Times New Roman" panose="02020603050405020304" pitchFamily="18" charset="0"/>
+              </a:rPr>
+              <a:t>decentralized </a:t>
+            </a:r>
+            <a:r>
+              <a:rPr lang="en-US" sz="2400" dirty="0">
+                <a:latin typeface="Times New Roman" panose="02020603050405020304" pitchFamily="18" charset="0"/>
+                <a:cs typeface="Times New Roman" panose="02020603050405020304" pitchFamily="18" charset="0"/>
+              </a:rPr>
+              <a:t>server architecture.</a:t>
             </a:r>
           </a:p>
           <a:p>
@@ -5911,7 +5916,7 @@
         <p:spPr>
           <a:xfrm>
             <a:off x="649432" y="582361"/>
-            <a:ext cx="10893136" cy="6186309"/>
+            <a:ext cx="10893136" cy="5632311"/>
           </a:xfrm>
           <a:prstGeom prst="rect">
             <a:avLst/>
@@ -6012,25 +6017,11 @@
               <a:buChar char="v"/>
             </a:pPr>
             <a:r>
-              <a:rPr lang="en-US" sz="2400" dirty="0" smtClean="0">
-                <a:latin typeface="Times New Roman" panose="02020603050405020304" pitchFamily="18" charset="0"/>
-                <a:cs typeface="Times New Roman" panose="02020603050405020304" pitchFamily="18" charset="0"/>
-              </a:rPr>
-              <a:t>Block-chain </a:t>
-            </a:r>
-            <a:r>
               <a:rPr lang="en-US" sz="2400" dirty="0">
                 <a:latin typeface="Times New Roman" panose="02020603050405020304" pitchFamily="18" charset="0"/>
                 <a:cs typeface="Times New Roman" panose="02020603050405020304" pitchFamily="18" charset="0"/>
               </a:rPr>
-              <a:t>Authentication</a:t>
-            </a:r>
-            <a:r>
-              <a:rPr lang="en-US" sz="2400" dirty="0" smtClean="0">
-                <a:latin typeface="Times New Roman" panose="02020603050405020304" pitchFamily="18" charset="0"/>
-                <a:cs typeface="Times New Roman" panose="02020603050405020304" pitchFamily="18" charset="0"/>
-              </a:rPr>
-              <a:t>:</a:t>
+              <a:t>Implementation of several platforms:</a:t>
             </a:r>
             <a:endParaRPr lang="en-US" sz="2400" dirty="0">
               <a:latin typeface="Times New Roman" panose="02020603050405020304" pitchFamily="18" charset="0"/>
@@ -6048,72 +6039,65 @@
                 <a:latin typeface="Times New Roman" panose="02020603050405020304" pitchFamily="18" charset="0"/>
                 <a:cs typeface="Times New Roman" panose="02020603050405020304" pitchFamily="18" charset="0"/>
               </a:rPr>
-              <a:t>	Leverages block-chain </a:t>
+              <a:t>	</a:t>
+            </a:r>
+            <a:r>
+              <a:rPr lang="en-US" sz="2400" dirty="0" smtClean="0">
+                <a:latin typeface="Times New Roman" panose="02020603050405020304" pitchFamily="18" charset="0"/>
+                <a:cs typeface="Times New Roman" panose="02020603050405020304" pitchFamily="18" charset="0"/>
+              </a:rPr>
+              <a:t>To </a:t>
+            </a:r>
+            <a:r>
+              <a:rPr lang="en-US" sz="2400" dirty="0" smtClean="0">
+                <a:latin typeface="Times New Roman" panose="02020603050405020304" pitchFamily="18" charset="0"/>
+                <a:cs typeface="Times New Roman" panose="02020603050405020304" pitchFamily="18" charset="0"/>
+              </a:rPr>
+              <a:t>creating </a:t>
             </a:r>
             <a:r>
               <a:rPr lang="en-US" sz="2400" dirty="0">
                 <a:latin typeface="Times New Roman" panose="02020603050405020304" pitchFamily="18" charset="0"/>
                 <a:cs typeface="Times New Roman" panose="02020603050405020304" pitchFamily="18" charset="0"/>
               </a:rPr>
-              <a:t>for user authentication.</a:t>
-            </a:r>
-          </a:p>
-          <a:p>
-            <a:pPr algn="just">
-              <a:lnSpc>
-                <a:spcPct val="150000"/>
-              </a:lnSpc>
-            </a:pPr>
+              <a:t>an integrated application programming interface (API) that can be used </a:t>
+            </a:r>
             <a:r>
               <a:rPr lang="en-US" sz="2400" dirty="0" smtClean="0">
                 <a:latin typeface="Times New Roman" panose="02020603050405020304" pitchFamily="18" charset="0"/>
                 <a:cs typeface="Times New Roman" panose="02020603050405020304" pitchFamily="18" charset="0"/>
               </a:rPr>
-              <a:t>	Each </a:t>
+              <a:t>	with </a:t>
             </a:r>
             <a:r>
               <a:rPr lang="en-US" sz="2400" dirty="0">
                 <a:latin typeface="Times New Roman" panose="02020603050405020304" pitchFamily="18" charset="0"/>
                 <a:cs typeface="Times New Roman" panose="02020603050405020304" pitchFamily="18" charset="0"/>
               </a:rPr>
-              <a:t>user has a unique identifier on the </a:t>
-            </a:r>
-            <a:r>
-              <a:rPr lang="en-US" sz="2400" dirty="0" smtClean="0">
+              <a:t>a variety of platforms, including mobile, software, </a:t>
+            </a:r>
+            <a:r>
+              <a:rPr lang="en-US" sz="2400">
                 <a:latin typeface="Times New Roman" panose="02020603050405020304" pitchFamily="18" charset="0"/>
                 <a:cs typeface="Times New Roman" panose="02020603050405020304" pitchFamily="18" charset="0"/>
               </a:rPr>
-              <a:t>block-chain</a:t>
+              <a:t>and </a:t>
+            </a:r>
+            <a:r>
+              <a:rPr lang="en-US" sz="2400" smtClean="0">
+                <a:latin typeface="Times New Roman" panose="02020603050405020304" pitchFamily="18" charset="0"/>
+                <a:cs typeface="Times New Roman" panose="02020603050405020304" pitchFamily="18" charset="0"/>
+              </a:rPr>
+              <a:t>Web </a:t>
             </a:r>
             <a:r>
               <a:rPr lang="en-US" sz="2400" dirty="0">
                 <a:latin typeface="Times New Roman" panose="02020603050405020304" pitchFamily="18" charset="0"/>
                 <a:cs typeface="Times New Roman" panose="02020603050405020304" pitchFamily="18" charset="0"/>
               </a:rPr>
-              <a:t>, enhancing security and </a:t>
-            </a:r>
-            <a:r>
-              <a:rPr lang="en-US" sz="2400" dirty="0" smtClean="0">
-                <a:latin typeface="Times New Roman" panose="02020603050405020304" pitchFamily="18" charset="0"/>
-                <a:cs typeface="Times New Roman" panose="02020603050405020304" pitchFamily="18" charset="0"/>
-              </a:rPr>
-              <a:t>	decentralizing </a:t>
-            </a:r>
-            <a:r>
-              <a:rPr lang="en-US" sz="2400" dirty="0">
-                <a:latin typeface="Times New Roman" panose="02020603050405020304" pitchFamily="18" charset="0"/>
-                <a:cs typeface="Times New Roman" panose="02020603050405020304" pitchFamily="18" charset="0"/>
-              </a:rPr>
-              <a:t>user management</a:t>
-            </a:r>
-            <a:r>
-              <a:rPr lang="en-US" sz="2400" dirty="0" smtClean="0">
-                <a:latin typeface="Times New Roman" panose="02020603050405020304" pitchFamily="18" charset="0"/>
-                <a:cs typeface="Times New Roman" panose="02020603050405020304" pitchFamily="18" charset="0"/>
-              </a:rPr>
-              <a:t>.</a:t>
-            </a:r>
-            <a:endParaRPr lang="en-US" sz="2400" dirty="0">
+              <a:t>applications</a:t>
+            </a:r>
+            <a:endParaRPr lang="en-US" sz="2400" dirty="0" smtClean="0">
               <a:latin typeface="Times New Roman" panose="02020603050405020304" pitchFamily="18" charset="0"/>
               <a:cs typeface="Times New Roman" panose="02020603050405020304" pitchFamily="18" charset="0"/>
             </a:endParaRPr>
@@ -6127,23 +6111,12 @@
               <a:buChar char="v"/>
             </a:pPr>
             <a:r>
-              <a:rPr lang="en-US" sz="2400" dirty="0">
-                <a:latin typeface="Times New Roman" panose="02020603050405020304" pitchFamily="18" charset="0"/>
-                <a:cs typeface="Times New Roman" panose="02020603050405020304" pitchFamily="18" charset="0"/>
-              </a:rPr>
-              <a:t>Decentralized Message Integrity</a:t>
-            </a:r>
-            <a:r>
               <a:rPr lang="en-US" sz="2400" dirty="0" smtClean="0">
                 <a:latin typeface="Times New Roman" panose="02020603050405020304" pitchFamily="18" charset="0"/>
                 <a:cs typeface="Times New Roman" panose="02020603050405020304" pitchFamily="18" charset="0"/>
               </a:rPr>
-              <a:t>:</a:t>
-            </a:r>
-            <a:endParaRPr lang="en-US" sz="2400" dirty="0">
-              <a:latin typeface="Times New Roman" panose="02020603050405020304" pitchFamily="18" charset="0"/>
-              <a:cs typeface="Times New Roman" panose="02020603050405020304" pitchFamily="18" charset="0"/>
-            </a:endParaRPr>
+              <a:t>Decentralized Message Integrity:</a:t>
+            </a:r>
           </a:p>
           <a:p>
             <a:pPr algn="just">
@@ -6663,8 +6636,8 @@
         </p:nvSpPr>
         <p:spPr>
           <a:xfrm>
-            <a:off x="891297" y="1531559"/>
-            <a:ext cx="10409406" cy="4110484"/>
+            <a:off x="757382" y="1411491"/>
+            <a:ext cx="10543321" cy="4110484"/>
           </a:xfrm>
         </p:spPr>
         <p:txBody>
@@ -7036,7 +7009,7 @@
         </p:nvSpPr>
         <p:spPr>
           <a:xfrm>
-            <a:off x="559340" y="1381381"/>
+            <a:off x="559340" y="1651795"/>
             <a:ext cx="11073319" cy="3554410"/>
           </a:xfrm>
         </p:spPr>
@@ -7053,11 +7026,18 @@
               <a:buNone/>
             </a:pPr>
             <a:r>
+              <a:rPr lang="en-US" sz="2400" dirty="0" smtClean="0">
+                <a:latin typeface="Times New Roman" panose="02020603050405020304" pitchFamily="18" charset="0"/>
+                <a:cs typeface="Times New Roman" panose="02020603050405020304" pitchFamily="18" charset="0"/>
+              </a:rPr>
+              <a:t>	In </a:t>
+            </a:r>
+            <a:r>
               <a:rPr lang="en-US" sz="2400" dirty="0">
                 <a:latin typeface="Times New Roman" panose="02020603050405020304" pitchFamily="18" charset="0"/>
                 <a:cs typeface="Times New Roman" panose="02020603050405020304" pitchFamily="18" charset="0"/>
               </a:rPr>
-              <a:t>In an era where digital communication plays a pivotal role in our daily lives, ensuring the confidentiality and integrity of our conversations is paramount. Introducing the "Secure Chat API," a revolutionary development in the realm of encrypted communication. This cutting-edge Chat Application Program Interface (API) not only prioritizes user privacy through robust encryption but also leverages the power of blockchain authentication for an unprecedented level of security. </a:t>
+              <a:t>an era where digital communication plays a pivotal role in our daily lives, ensuring the confidentiality and integrity of our conversations is paramount. Introducing the "Secure Chat API," a revolutionary development in the realm of encrypted communication. This cutting-edge Chat Application Program Interface (API) not only prioritizes user privacy through robust encryption but also leverages the power of blockchain authentication for an unprecedented level of security. </a:t>
             </a:r>
           </a:p>
         </p:txBody>
@@ -7473,7 +7453,11 @@
             <a:graphicFrameLocks noGrp="1"/>
           </p:cNvGraphicFramePr>
           <p:nvPr>
-            <p:extLst/>
+            <p:extLst>
+              <p:ext uri="{D42A27DB-BD31-4B8C-83A1-F6EECF244321}">
+                <p14:modId xmlns:p14="http://schemas.microsoft.com/office/powerpoint/2010/main" val="1643381813"/>
+              </p:ext>
+            </p:extLst>
           </p:nvPr>
         </p:nvGraphicFramePr>
         <p:xfrm>
@@ -7900,7 +7884,7 @@
                           <a:latin typeface="Times New Roman" panose="02020603050405020304" pitchFamily="18" charset="0"/>
                           <a:cs typeface="Times New Roman" panose="02020603050405020304" pitchFamily="18" charset="0"/>
                         </a:rPr>
-                        <a:t>Disadvantaged</a:t>
+                        <a:t>Disadvantages</a:t>
                       </a:r>
                       <a:endParaRPr lang="en-US" dirty="0">
                         <a:solidFill>
@@ -8997,12 +8981,16 @@
             <a:graphicFrameLocks noGrp="1"/>
           </p:cNvGraphicFramePr>
           <p:nvPr>
-            <p:extLst/>
+            <p:extLst>
+              <p:ext uri="{D42A27DB-BD31-4B8C-83A1-F6EECF244321}">
+                <p14:modId xmlns:p14="http://schemas.microsoft.com/office/powerpoint/2010/main" val="568366324"/>
+              </p:ext>
+            </p:extLst>
           </p:nvPr>
         </p:nvGraphicFramePr>
         <p:xfrm>
           <a:off x="609600" y="847934"/>
-          <a:ext cx="10972800" cy="5864538"/>
+          <a:ext cx="10972800" cy="5093819"/>
         </p:xfrm>
         <a:graphic>
           <a:graphicData uri="http://schemas.openxmlformats.org/drawingml/2006/table">
@@ -9025,21 +9013,21 @@
                     </a:ext>
                   </a:extLst>
                 </a:gridCol>
-                <a:gridCol w="3011054">
+                <a:gridCol w="2937163">
                   <a:extLst>
                     <a:ext uri="{9D8B030D-6E8A-4147-A177-3AD203B41FA5}">
                       <a16:colId xmlns:a16="http://schemas.microsoft.com/office/drawing/2014/main" val="1934009595"/>
                     </a:ext>
                   </a:extLst>
                 </a:gridCol>
-                <a:gridCol w="1192379">
+                <a:gridCol w="1394691">
                   <a:extLst>
                     <a:ext uri="{9D8B030D-6E8A-4147-A177-3AD203B41FA5}">
                       <a16:colId xmlns:a16="http://schemas.microsoft.com/office/drawing/2014/main" val="2106811707"/>
                     </a:ext>
                   </a:extLst>
                 </a:gridCol>
-                <a:gridCol w="1541585">
+                <a:gridCol w="1413164">
                   <a:extLst>
                     <a:ext uri="{9D8B030D-6E8A-4147-A177-3AD203B41FA5}">
                       <a16:colId xmlns:a16="http://schemas.microsoft.com/office/drawing/2014/main" val="4161205106"/>
@@ -9054,7 +9042,7 @@
                   </a:extLst>
                 </a:gridCol>
               </a:tblGrid>
-              <a:tr h="1566858">
+              <a:tr h="796139">
                 <a:tc>
                   <a:txBody>
                     <a:bodyPr/>
@@ -9424,7 +9412,7 @@
                           <a:latin typeface="Times New Roman" panose="02020603050405020304" pitchFamily="18" charset="0"/>
                           <a:cs typeface="Times New Roman" panose="02020603050405020304" pitchFamily="18" charset="0"/>
                         </a:rPr>
-                        <a:t>Disadvantaged</a:t>
+                        <a:t>Disadvantages</a:t>
                       </a:r>
                       <a:endParaRPr lang="en-US" dirty="0">
                         <a:solidFill>
@@ -9727,7 +9715,7 @@
                           <a:ea typeface="+mn-ea"/>
                           <a:cs typeface="Times New Roman" panose="02020603050405020304" pitchFamily="18" charset="0"/>
                         </a:rPr>
-                        <a:t>proposing a secure messaging protocol that utilizes SHA-2 hash generation for key generation and AES-256 encryption for securing messages during transmission. </a:t>
+                        <a:t>Proposing a secure messaging protocol that utilizes SHA-2 hash generation for key generation and AES-256 encryption for securing messages during transmission. </a:t>
                       </a:r>
                       <a:endParaRPr lang="en-US" dirty="0">
                         <a:solidFill>
@@ -10146,17 +10134,7 @@
                           <a:latin typeface="Times New Roman" panose="02020603050405020304" pitchFamily="18" charset="0"/>
                           <a:cs typeface="Times New Roman" panose="02020603050405020304" pitchFamily="18" charset="0"/>
                         </a:rPr>
-                        <a:t>Developing </a:t>
-                      </a:r>
-                      <a:r>
-                        <a:rPr lang="en-US" dirty="0" smtClean="0">
-                          <a:solidFill>
-                            <a:schemeClr val="tx1"/>
-                          </a:solidFill>
-                          <a:latin typeface="Times New Roman" panose="02020603050405020304" pitchFamily="18" charset="0"/>
-                          <a:cs typeface="Times New Roman" panose="02020603050405020304" pitchFamily="18" charset="0"/>
-                        </a:rPr>
-                        <a:t>an End-to-End Secure Chat Application </a:t>
+                        <a:t>Developing an End-to-End Secure Chat Application </a:t>
                       </a:r>
                     </a:p>
                   </a:txBody>
@@ -10610,12 +10588,16 @@
             <a:graphicFrameLocks noGrp="1"/>
           </p:cNvGraphicFramePr>
           <p:nvPr>
-            <p:extLst/>
+            <p:extLst>
+              <p:ext uri="{D42A27DB-BD31-4B8C-83A1-F6EECF244321}">
+                <p14:modId xmlns:p14="http://schemas.microsoft.com/office/powerpoint/2010/main" val="1668745924"/>
+              </p:ext>
+            </p:extLst>
           </p:nvPr>
         </p:nvGraphicFramePr>
         <p:xfrm>
           <a:off x="609600" y="854092"/>
-          <a:ext cx="10972800" cy="5864538"/>
+          <a:ext cx="10972800" cy="5041479"/>
         </p:xfrm>
         <a:graphic>
           <a:graphicData uri="http://schemas.openxmlformats.org/drawingml/2006/table">
@@ -10667,7 +10649,7 @@
                   </a:extLst>
                 </a:gridCol>
               </a:tblGrid>
-              <a:tr h="1566858">
+              <a:tr h="743799">
                 <a:tc>
                   <a:txBody>
                     <a:bodyPr/>
@@ -11037,7 +11019,7 @@
                           <a:latin typeface="Times New Roman" panose="02020603050405020304" pitchFamily="18" charset="0"/>
                           <a:cs typeface="Times New Roman" panose="02020603050405020304" pitchFamily="18" charset="0"/>
                         </a:rPr>
-                        <a:t>Disadvantaged</a:t>
+                        <a:t>Disadvantages</a:t>
                       </a:r>
                       <a:endParaRPr lang="en-US" dirty="0">
                         <a:solidFill>
@@ -11928,11 +11910,23 @@
                             <a:schemeClr val="dk1"/>
                           </a:solidFill>
                           <a:effectLst/>
-                          <a:latin typeface="+mn-lt"/>
+                          <a:latin typeface="Times New Roman" panose="02020603050405020304" pitchFamily="18" charset="0"/>
                           <a:ea typeface="+mn-ea"/>
-                          <a:cs typeface="+mn-cs"/>
-                        </a:rPr>
-                        <a:t>utilizing both asymmetric and symmetric cryptography</a:t>
+                          <a:cs typeface="Times New Roman" panose="02020603050405020304" pitchFamily="18" charset="0"/>
+                        </a:rPr>
+                        <a:t>Utilizing </a:t>
+                      </a:r>
+                      <a:r>
+                        <a:rPr lang="en-US" sz="1800" b="0" i="0" kern="1200" dirty="0" smtClean="0">
+                          <a:solidFill>
+                            <a:schemeClr val="dk1"/>
+                          </a:solidFill>
+                          <a:effectLst/>
+                          <a:latin typeface="Times New Roman" panose="02020603050405020304" pitchFamily="18" charset="0"/>
+                          <a:ea typeface="+mn-ea"/>
+                          <a:cs typeface="Times New Roman" panose="02020603050405020304" pitchFamily="18" charset="0"/>
+                        </a:rPr>
+                        <a:t>both asymmetric and symmetric cryptography</a:t>
                       </a:r>
                       <a:endParaRPr lang="en-US" dirty="0">
                         <a:solidFill>
@@ -12212,7 +12206,8 @@
               <a:t>LITERATURE SURVEY</a:t>
             </a:r>
             <a:endParaRPr lang="en-US" sz="3600" b="1" dirty="0">
-              <a:latin typeface="Times New Roman" pitchFamily="18" charset="0"/>
+              <a:latin typeface="Times New Roman" panose="02020603050405020304" pitchFamily="18" charset="0"/>
+              <a:cs typeface="Times New Roman" panose="02020603050405020304" pitchFamily="18" charset="0"/>
             </a:endParaRPr>
           </a:p>
         </p:txBody>
@@ -12228,7 +12223,7 @@
     <a:masterClrMapping/>
   </p:clrMapOvr>
   <p:transition spd="slow">
-    <p:wipe/>
+    <p:push dir="u"/>
   </p:transition>
   <p:timing>
     <p:tnLst>
@@ -12299,12 +12294,16 @@
             <a:graphicFrameLocks noGrp="1"/>
           </p:cNvGraphicFramePr>
           <p:nvPr>
-            <p:extLst/>
+            <p:extLst>
+              <p:ext uri="{D42A27DB-BD31-4B8C-83A1-F6EECF244321}">
+                <p14:modId xmlns:p14="http://schemas.microsoft.com/office/powerpoint/2010/main" val="4170919727"/>
+              </p:ext>
+            </p:extLst>
           </p:nvPr>
         </p:nvGraphicFramePr>
         <p:xfrm>
           <a:off x="609600" y="817671"/>
-          <a:ext cx="10972800" cy="5837358"/>
+          <a:ext cx="10972800" cy="5638589"/>
         </p:xfrm>
         <a:graphic>
           <a:graphicData uri="http://schemas.openxmlformats.org/drawingml/2006/table">
@@ -12726,7 +12725,7 @@
                           <a:latin typeface="Times New Roman" panose="02020603050405020304" pitchFamily="18" charset="0"/>
                           <a:cs typeface="Times New Roman" panose="02020603050405020304" pitchFamily="18" charset="0"/>
                         </a:rPr>
-                        <a:t>Disadvantaged</a:t>
+                        <a:t>Disadvantages</a:t>
                       </a:r>
                       <a:endParaRPr lang="en-US" dirty="0">
                         <a:solidFill>
@@ -12998,7 +12997,21 @@
                           <a:latin typeface="Times New Roman" panose="02020603050405020304" pitchFamily="18" charset="0"/>
                           <a:cs typeface="Times New Roman" panose="02020603050405020304" pitchFamily="18" charset="0"/>
                         </a:rPr>
-                        <a:t>Inside Java(TM) 2 Platform Security, the definitive and comprehensive guide to the Java security platform, has been thoroughly updated to reflect key additions and revisions to Java security technologies currently in use by leading technology co</a:t>
+                        <a:t>Inside Java(TM) 2 Platform Security, the definitive and comprehensive guide to the Java security platform, has been </a:t>
+                      </a:r>
+                      <a:r>
+                        <a:rPr lang="en-US" dirty="0" smtClean="0">
+                          <a:latin typeface="Times New Roman" panose="02020603050405020304" pitchFamily="18" charset="0"/>
+                          <a:cs typeface="Times New Roman" panose="02020603050405020304" pitchFamily="18" charset="0"/>
+                        </a:rPr>
+                        <a:t>thoroughly </a:t>
+                      </a:r>
+                      <a:r>
+                        <a:rPr lang="en-US" dirty="0" smtClean="0">
+                          <a:latin typeface="Times New Roman" panose="02020603050405020304" pitchFamily="18" charset="0"/>
+                          <a:cs typeface="Times New Roman" panose="02020603050405020304" pitchFamily="18" charset="0"/>
+                        </a:rPr>
+                        <a:t>updated to reflect key additions and revisions to Java security technologies currently in use by leading technology co</a:t>
                       </a:r>
                       <a:endParaRPr lang="en-US" dirty="0">
                         <a:solidFill>
@@ -13056,11 +13069,17 @@
                     <a:p>
                       <a:pPr algn="ctr"/>
                       <a:r>
-                        <a:rPr lang="en-US" baseline="0" dirty="0" smtClean="0"/>
+                        <a:rPr lang="en-US" baseline="0" dirty="0" smtClean="0">
+                          <a:latin typeface="Times New Roman" panose="02020603050405020304" pitchFamily="18" charset="0"/>
+                          <a:cs typeface="Times New Roman" panose="02020603050405020304" pitchFamily="18" charset="0"/>
+                        </a:rPr>
                         <a:t> </a:t>
                       </a:r>
                       <a:r>
-                        <a:rPr lang="en-US" dirty="0" smtClean="0"/>
+                        <a:rPr lang="en-US" dirty="0" smtClean="0">
+                          <a:latin typeface="Times New Roman" panose="02020603050405020304" pitchFamily="18" charset="0"/>
+                          <a:cs typeface="Times New Roman" panose="02020603050405020304" pitchFamily="18" charset="0"/>
+                        </a:rPr>
                         <a:t>Java(TM) 2</a:t>
                       </a:r>
                       <a:endParaRPr lang="en-US" dirty="0">
@@ -13119,22 +13138,34 @@
                     <a:p>
                       <a:pPr algn="ctr"/>
                       <a:r>
-                        <a:rPr lang="en-US" dirty="0" smtClean="0"/>
+                        <a:rPr lang="en-US" dirty="0" smtClean="0">
+                          <a:latin typeface="Times New Roman" panose="02020603050405020304" pitchFamily="18" charset="0"/>
+                          <a:cs typeface="Times New Roman" panose="02020603050405020304" pitchFamily="18" charset="0"/>
+                        </a:rPr>
                         <a:t>Decentralized</a:t>
                       </a:r>
                     </a:p>
                     <a:p>
                       <a:pPr algn="ctr"/>
                       <a:r>
-                        <a:rPr lang="en-US" dirty="0" smtClean="0"/>
+                        <a:rPr lang="en-US" dirty="0" smtClean="0">
+                          <a:latin typeface="Times New Roman" panose="02020603050405020304" pitchFamily="18" charset="0"/>
+                          <a:cs typeface="Times New Roman" panose="02020603050405020304" pitchFamily="18" charset="0"/>
+                        </a:rPr>
                         <a:t>Block-chain</a:t>
                       </a:r>
                       <a:r>
-                        <a:rPr lang="en-US" baseline="0" dirty="0" smtClean="0"/>
+                        <a:rPr lang="en-US" baseline="0" dirty="0" smtClean="0">
+                          <a:latin typeface="Times New Roman" panose="02020603050405020304" pitchFamily="18" charset="0"/>
+                          <a:cs typeface="Times New Roman" panose="02020603050405020304" pitchFamily="18" charset="0"/>
+                        </a:rPr>
                         <a:t> </a:t>
                       </a:r>
                       <a:r>
-                        <a:rPr lang="en-US" dirty="0" smtClean="0"/>
+                        <a:rPr lang="en-US" dirty="0" smtClean="0">
+                          <a:latin typeface="Times New Roman" panose="02020603050405020304" pitchFamily="18" charset="0"/>
+                          <a:cs typeface="Times New Roman" panose="02020603050405020304" pitchFamily="18" charset="0"/>
+                        </a:rPr>
                         <a:t>Based Messaging Network</a:t>
                       </a:r>
                       <a:endParaRPr lang="en-US" dirty="0">
@@ -13476,23 +13507,11 @@
                             <a:schemeClr val="dk1"/>
                           </a:solidFill>
                           <a:effectLst/>
-                          <a:latin typeface="+mn-lt"/>
+                          <a:latin typeface="Times New Roman" panose="02020603050405020304" pitchFamily="18" charset="0"/>
                           <a:ea typeface="+mn-ea"/>
-                          <a:cs typeface="+mn-cs"/>
-                        </a:rPr>
-                        <a:t> </a:t>
-                      </a:r>
-                      <a:r>
-                        <a:rPr lang="en-US" sz="1800" b="0" i="0" kern="1200" dirty="0" smtClean="0">
-                          <a:solidFill>
-                            <a:schemeClr val="dk1"/>
-                          </a:solidFill>
-                          <a:effectLst/>
-                          <a:latin typeface="+mn-lt"/>
-                          <a:ea typeface="+mn-ea"/>
-                          <a:cs typeface="+mn-cs"/>
-                        </a:rPr>
-                        <a:t>A new access-control mechanism for Web-based system applications.</a:t>
+                          <a:cs typeface="Times New Roman" panose="02020603050405020304" pitchFamily="18" charset="0"/>
+                        </a:rPr>
+                        <a:t> A new access-control mechanism for Web-based system applications.</a:t>
                       </a:r>
                       <a:endParaRPr lang="en-US" dirty="0">
                         <a:solidFill>
@@ -13555,9 +13574,9 @@
                             <a:schemeClr val="dk1"/>
                           </a:solidFill>
                           <a:effectLst/>
-                          <a:latin typeface="+mn-lt"/>
+                          <a:latin typeface="Times New Roman" panose="02020603050405020304" pitchFamily="18" charset="0"/>
                           <a:ea typeface="+mn-ea"/>
-                          <a:cs typeface="+mn-cs"/>
+                          <a:cs typeface="Times New Roman" panose="02020603050405020304" pitchFamily="18" charset="0"/>
                         </a:rPr>
                         <a:t> To overcome the app is anticipated in the chats are secured by the dynamic key encryption by md5 algorithm</a:t>
                       </a:r>
@@ -13635,9 +13654,9 @@
                             <a:schemeClr val="dk1"/>
                           </a:solidFill>
                           <a:effectLst/>
-                          <a:latin typeface="+mn-lt"/>
+                          <a:latin typeface="Times New Roman" panose="02020603050405020304" pitchFamily="18" charset="0"/>
                           <a:ea typeface="+mn-ea"/>
-                          <a:cs typeface="+mn-cs"/>
+                          <a:cs typeface="Times New Roman" panose="02020603050405020304" pitchFamily="18" charset="0"/>
                         </a:rPr>
                         <a:t>security and consistency</a:t>
                       </a:r>
@@ -13809,7 +13828,7 @@
     <a:masterClrMapping/>
   </p:clrMapOvr>
   <p:transition spd="slow">
-    <p:wipe/>
+    <p:push dir="u"/>
   </p:transition>
   <p:timing>
     <p:tnLst>

</xml_diff>